<commit_message>
Ready for Nov 6 class
</commit_message>
<xml_diff>
--- a/Presentations/Class 8 - Oct 30.pptx
+++ b/Presentations/Class 8 - Oct 30.pptx
@@ -107,7 +107,16 @@
       </a:defRPr>
     </a:lvl9pPr>
   </p:defaultTextStyle>
+  <p:extLst>
+    <p:ext uri="{EFAFB233-063F-42B5-8137-9DF3F51BA10A}">
+      <p15:sldGuideLst xmlns:p15="http://schemas.microsoft.com/office/powerpoint/2012/main"/>
+    </p:ext>
+  </p:extLst>
 </p:presentation>
+</file>
+
+<file path=ppt/revisionInfo.xml><?xml version="1.0" encoding="utf-8"?>
+<p1510:revInfo xmlns:a="http://schemas.openxmlformats.org/drawingml/2006/main" xmlns:r="http://schemas.openxmlformats.org/officeDocument/2006/relationships" xmlns:p1510="http://schemas.microsoft.com/office/powerpoint/2015/10/main"/>
 </file>
 
 <file path=ppt/slideLayouts/slideLayout1.xml><?xml version="1.0" encoding="utf-8"?>
@@ -3111,6 +3120,48 @@
               <a:t>Midterms were finished!</a:t>
             </a:r>
           </a:p>
+          <a:p>
+            <a:endParaRPr lang="en-US" dirty="0"/>
+          </a:p>
+          <a:p>
+            <a:r>
+              <a:rPr lang="en-US" dirty="0"/>
+              <a:t>Collisions</a:t>
+            </a:r>
+          </a:p>
+          <a:p>
+            <a:pPr lvl="1"/>
+            <a:r>
+              <a:rPr lang="en-US" dirty="0">
+                <a:hlinkClick r:id="rId2"/>
+              </a:rPr>
+              <a:t>Guide Posted</a:t>
+            </a:r>
+            <a:endParaRPr lang="en-US" dirty="0"/>
+          </a:p>
+          <a:p>
+            <a:pPr lvl="1"/>
+            <a:r>
+              <a:rPr lang="en-US" dirty="0"/>
+              <a:t>Just realized how poorly the guides look and work, sorry!</a:t>
+            </a:r>
+          </a:p>
+          <a:p>
+            <a:pPr lvl="1"/>
+            <a:r>
+              <a:rPr lang="en-US" dirty="0">
+                <a:hlinkClick r:id="rId3"/>
+              </a:rPr>
+              <a:t>https://github.com/crhallberg/IMM120</a:t>
+            </a:r>
+            <a:r>
+              <a:rPr lang="en-US" dirty="0"/>
+              <a:t> </a:t>
+            </a:r>
+          </a:p>
+          <a:p>
+            <a:endParaRPr lang="en-US" dirty="0"/>
+          </a:p>
         </p:txBody>
       </p:sp>
     </p:spTree>
@@ -3318,7 +3369,7 @@
 <file path=ppt/theme/theme1.xml><?xml version="1.0" encoding="utf-8"?>
 <a:theme xmlns:a="http://schemas.openxmlformats.org/drawingml/2006/main" name="Office Theme">
   <a:themeElements>
-    <a:clrScheme name="Blue II">
+    <a:clrScheme name="Median">
       <a:dk1>
         <a:sysClr val="windowText" lastClr="000000"/>
       </a:dk1>
@@ -3326,34 +3377,34 @@
         <a:sysClr val="window" lastClr="FFFFFF"/>
       </a:lt1>
       <a:dk2>
-        <a:srgbClr val="335B74"/>
+        <a:srgbClr val="775F55"/>
       </a:dk2>
       <a:lt2>
-        <a:srgbClr val="DFE3E5"/>
+        <a:srgbClr val="EBDDC3"/>
       </a:lt2>
       <a:accent1>
-        <a:srgbClr val="1CADE4"/>
+        <a:srgbClr val="94B6D2"/>
       </a:accent1>
       <a:accent2>
-        <a:srgbClr val="2683C6"/>
+        <a:srgbClr val="DD8047"/>
       </a:accent2>
       <a:accent3>
-        <a:srgbClr val="27CED7"/>
+        <a:srgbClr val="A5AB81"/>
       </a:accent3>
       <a:accent4>
-        <a:srgbClr val="42BA97"/>
+        <a:srgbClr val="D8B25C"/>
       </a:accent4>
       <a:accent5>
-        <a:srgbClr val="3E8853"/>
+        <a:srgbClr val="7BA79D"/>
       </a:accent5>
       <a:accent6>
-        <a:srgbClr val="62A39F"/>
+        <a:srgbClr val="968C8C"/>
       </a:accent6>
       <a:hlink>
-        <a:srgbClr val="6EAC1C"/>
+        <a:srgbClr val="F7B615"/>
       </a:hlink>
       <a:folHlink>
-        <a:srgbClr val="B26B02"/>
+        <a:srgbClr val="704404"/>
       </a:folHlink>
     </a:clrScheme>
     <a:fontScheme name="Source Sans Pro">

</xml_diff>